<commit_message>
Update SRSPresentation notes for future reference
</commit_message>
<xml_diff>
--- a/docs/Presentations/SRSPresentation/SRSPresentation.pptx
+++ b/docs/Presentations/SRSPresentation/SRSPresentation.pptx
@@ -125,7 +125,7 @@
 <file path=ppt/revisionInfo.xml><?xml version="1.0" encoding="utf-8"?>
 <p1510:revInfo xmlns:a="http://schemas.openxmlformats.org/drawingml/2006/main" xmlns:r="http://schemas.openxmlformats.org/officeDocument/2006/relationships" xmlns:p1510="http://schemas.microsoft.com/office/powerpoint/2015/10/main">
   <p1510:revLst>
-    <p1510:client id="{ACCD79ED-BFAE-4857-8FB5-603E641725DE}" v="52" dt="2024-01-25T18:38:04.545"/>
+    <p1510:client id="{ACCD79ED-BFAE-4857-8FB5-603E641725DE}" v="182" dt="2024-01-26T19:32:54.796"/>
   </p1510:revLst>
 </p1510:revInfo>
 </file>
@@ -135,7 +135,7 @@
   <pc:docChgLst>
     <pc:chgData name="Hunter Ceranic" userId="55b8025d37c61089" providerId="LiveId" clId="{ACCD79ED-BFAE-4857-8FB5-603E641725DE}"/>
     <pc:docChg chg="undo redo custSel addSld delSld modSld sldOrd addMainMaster delMainMaster">
-      <pc:chgData name="Hunter Ceranic" userId="55b8025d37c61089" providerId="LiveId" clId="{ACCD79ED-BFAE-4857-8FB5-603E641725DE}" dt="2024-01-25T18:40:01.439" v="3766" actId="20577"/>
+      <pc:chgData name="Hunter Ceranic" userId="55b8025d37c61089" providerId="LiveId" clId="{ACCD79ED-BFAE-4857-8FB5-603E641725DE}" dt="2024-01-26T19:32:54.795" v="3897" actId="20577"/>
       <pc:docMkLst>
         <pc:docMk/>
       </pc:docMkLst>
@@ -488,7 +488,7 @@
         </pc:spChg>
       </pc:sldChg>
       <pc:sldChg chg="addSp delSp modSp new mod ord">
-        <pc:chgData name="Hunter Ceranic" userId="55b8025d37c61089" providerId="LiveId" clId="{ACCD79ED-BFAE-4857-8FB5-603E641725DE}" dt="2024-01-25T18:38:21.864" v="3721" actId="26606"/>
+        <pc:chgData name="Hunter Ceranic" userId="55b8025d37c61089" providerId="LiveId" clId="{ACCD79ED-BFAE-4857-8FB5-603E641725DE}" dt="2024-01-26T19:32:54.795" v="3897" actId="20577"/>
         <pc:sldMkLst>
           <pc:docMk/>
           <pc:sldMk cId="3488984038" sldId="260"/>
@@ -525,8 +525,8 @@
             <ac:spMk id="5" creationId="{1EF2BD1D-C346-969D-0000-25EBA3216018}"/>
           </ac:spMkLst>
         </pc:spChg>
-        <pc:graphicFrameChg chg="add">
-          <ac:chgData name="Hunter Ceranic" userId="55b8025d37c61089" providerId="LiveId" clId="{ACCD79ED-BFAE-4857-8FB5-603E641725DE}" dt="2024-01-25T18:38:21.864" v="3721" actId="26606"/>
+        <pc:graphicFrameChg chg="add mod">
+          <ac:chgData name="Hunter Ceranic" userId="55b8025d37c61089" providerId="LiveId" clId="{ACCD79ED-BFAE-4857-8FB5-603E641725DE}" dt="2024-01-26T19:32:54.795" v="3897" actId="20577"/>
           <ac:graphicFrameMkLst>
             <pc:docMk/>
             <pc:sldMk cId="3488984038" sldId="260"/>
@@ -1144,6 +1144,13 @@
             <ac:picMk id="8" creationId="{6F197B8F-C90C-17EF-FBF7-04F6F2F6EF94}"/>
           </ac:picMkLst>
         </pc:picChg>
+      </pc:sldChg>
+      <pc:sldChg chg="new del">
+        <pc:chgData name="Hunter Ceranic" userId="55b8025d37c61089" providerId="LiveId" clId="{ACCD79ED-BFAE-4857-8FB5-603E641725DE}" dt="2024-01-26T18:32:03.346" v="3768" actId="680"/>
+        <pc:sldMkLst>
+          <pc:docMk/>
+          <pc:sldMk cId="1351124811" sldId="265"/>
+        </pc:sldMkLst>
       </pc:sldChg>
       <pc:sldMasterChg chg="add del addSldLayout delSldLayout">
         <pc:chgData name="Hunter Ceranic" userId="55b8025d37c61089" providerId="LiveId" clId="{ACCD79ED-BFAE-4857-8FB5-603E641725DE}" dt="2024-01-23T20:03:02.922" v="3" actId="26606"/>
@@ -2281,7 +2288,7 @@
 <dgm:dataModel xmlns:dgm="http://schemas.openxmlformats.org/drawingml/2006/diagram" xmlns:a="http://schemas.openxmlformats.org/drawingml/2006/main">
   <dgm:ptLst>
     <dgm:pt modelId="{2A3DA79F-081F-4BB4-82F9-E03BAE47D8D2}" type="doc">
-      <dgm:prSet loTypeId="urn:microsoft.com/office/officeart/2005/8/layout/vList2" loCatId="list" qsTypeId="urn:microsoft.com/office/officeart/2005/8/quickstyle/simple1" qsCatId="simple" csTypeId="urn:microsoft.com/office/officeart/2005/8/colors/accent1_2" csCatId="accent1"/>
+      <dgm:prSet loTypeId="urn:microsoft.com/office/officeart/2005/8/layout/vList2" loCatId="list" qsTypeId="urn:microsoft.com/office/officeart/2005/8/quickstyle/simple1" qsCatId="simple" csTypeId="urn:microsoft.com/office/officeart/2005/8/colors/accent1_2" csCatId="accent1" phldr="1"/>
       <dgm:spPr/>
       <dgm:t>
         <a:bodyPr/>
@@ -2373,10 +2380,10 @@
         <a:lstStyle/>
         <a:p>
           <a:r>
-            <a:rPr lang="en-CA"/>
+            <a:rPr lang="en-CA" dirty="0"/>
             <a:t>A3: The dataset for training will only contain labels of capital letter characters, and an even spread of every label to be trained.</a:t>
           </a:r>
-          <a:endParaRPr lang="en-US"/>
+          <a:endParaRPr lang="en-US" dirty="0"/>
         </a:p>
       </dgm:t>
     </dgm:pt>
@@ -2573,7 +2580,7 @@
   <dgm:whole/>
   <dgm:extLst>
     <a:ext uri="http://schemas.microsoft.com/office/drawing/2008/diagram">
-      <dsp:dataModelExt xmlns:dsp="http://schemas.microsoft.com/office/drawing/2008/diagram" relId="rId6" minVer="http://schemas.openxmlformats.org/drawingml/2006/diagram"/>
+      <dsp:dataModelExt xmlns:dsp="http://schemas.microsoft.com/office/drawing/2008/diagram" relId="rId7" minVer="http://schemas.openxmlformats.org/drawingml/2006/diagram"/>
     </a:ext>
   </dgm:extLst>
 </dgm:dataModel>
@@ -2813,10 +2820,10 @@
             <a:buNone/>
           </a:pPr>
           <a:r>
-            <a:rPr lang="en-CA" sz="1800" kern="1200"/>
+            <a:rPr lang="en-CA" sz="1800" kern="1200" dirty="0"/>
             <a:t>A3: The dataset for training will only contain labels of capital letter characters, and an even spread of every label to be trained.</a:t>
           </a:r>
-          <a:endParaRPr lang="en-US" sz="1800" kern="1200"/>
+          <a:endParaRPr lang="en-US" sz="1800" kern="1200" dirty="0"/>
         </a:p>
       </dsp:txBody>
       <dsp:txXfrm>
@@ -4269,7 +4276,7 @@
           <a:p>
             <a:fld id="{9E418AF7-6E72-4403-B085-4589D1110134}" type="datetimeFigureOut">
               <a:rPr lang="en-CA" smtClean="0"/>
-              <a:t>2024-01-25</a:t>
+              <a:t>2024-01-26</a:t>
             </a:fld>
             <a:endParaRPr lang="en-CA"/>
           </a:p>
@@ -4537,6 +4544,204 @@
 </p:notesMaster>
 </file>
 
+<file path=ppt/notesSlides/notesSlide1.xml><?xml version="1.0" encoding="utf-8"?>
+<p:notes xmlns:a="http://schemas.openxmlformats.org/drawingml/2006/main" xmlns:r="http://schemas.openxmlformats.org/officeDocument/2006/relationships" xmlns:p="http://schemas.openxmlformats.org/presentationml/2006/main">
+  <p:cSld>
+    <p:spTree>
+      <p:nvGrpSpPr>
+        <p:cNvPr id="1" name=""/>
+        <p:cNvGrpSpPr/>
+        <p:nvPr/>
+      </p:nvGrpSpPr>
+      <p:grpSpPr>
+        <a:xfrm>
+          <a:off x="0" y="0"/>
+          <a:ext cx="0" cy="0"/>
+          <a:chOff x="0" y="0"/>
+          <a:chExt cx="0" cy="0"/>
+        </a:xfrm>
+      </p:grpSpPr>
+      <p:sp>
+        <p:nvSpPr>
+          <p:cNvPr id="2" name="Slide Image Placeholder 1"/>
+          <p:cNvSpPr>
+            <a:spLocks noGrp="1" noRot="1" noChangeAspect="1"/>
+          </p:cNvSpPr>
+          <p:nvPr>
+            <p:ph type="sldImg"/>
+          </p:nvPr>
+        </p:nvSpPr>
+        <p:spPr/>
+      </p:sp>
+      <p:sp>
+        <p:nvSpPr>
+          <p:cNvPr id="3" name="Notes Placeholder 2"/>
+          <p:cNvSpPr>
+            <a:spLocks noGrp="1"/>
+          </p:cNvSpPr>
+          <p:nvPr>
+            <p:ph type="body" idx="1"/>
+          </p:nvPr>
+        </p:nvSpPr>
+        <p:spPr/>
+        <p:txBody>
+          <a:bodyPr/>
+          <a:lstStyle/>
+          <a:p>
+            <a:r>
+              <a:rPr lang="en-CA" dirty="0"/>
+              <a:t>Goal is only after model is built. Remove the function names for </a:t>
+            </a:r>
+            <a:r>
+              <a:rPr lang="en-CA"/>
+              <a:t>more abstraction.</a:t>
+            </a:r>
+          </a:p>
+        </p:txBody>
+      </p:sp>
+      <p:sp>
+        <p:nvSpPr>
+          <p:cNvPr id="4" name="Slide Number Placeholder 3"/>
+          <p:cNvSpPr>
+            <a:spLocks noGrp="1"/>
+          </p:cNvSpPr>
+          <p:nvPr>
+            <p:ph type="sldNum" sz="quarter" idx="5"/>
+          </p:nvPr>
+        </p:nvSpPr>
+        <p:spPr/>
+        <p:txBody>
+          <a:bodyPr/>
+          <a:lstStyle/>
+          <a:p>
+            <a:fld id="{04F82448-C671-4DAB-B542-F04D10043DD5}" type="slidenum">
+              <a:rPr lang="en-CA" smtClean="0"/>
+              <a:t>3</a:t>
+            </a:fld>
+            <a:endParaRPr lang="en-CA"/>
+          </a:p>
+        </p:txBody>
+      </p:sp>
+    </p:spTree>
+    <p:extLst>
+      <p:ext uri="{BB962C8B-B14F-4D97-AF65-F5344CB8AC3E}">
+        <p14:creationId xmlns:p14="http://schemas.microsoft.com/office/powerpoint/2010/main" val="2120528096"/>
+      </p:ext>
+    </p:extLst>
+  </p:cSld>
+  <p:clrMapOvr>
+    <a:masterClrMapping/>
+  </p:clrMapOvr>
+</p:notes>
+</file>
+
+<file path=ppt/notesSlides/notesSlide2.xml><?xml version="1.0" encoding="utf-8"?>
+<p:notes xmlns:a="http://schemas.openxmlformats.org/drawingml/2006/main" xmlns:r="http://schemas.openxmlformats.org/officeDocument/2006/relationships" xmlns:p="http://schemas.openxmlformats.org/presentationml/2006/main">
+  <p:cSld>
+    <p:spTree>
+      <p:nvGrpSpPr>
+        <p:cNvPr id="1" name=""/>
+        <p:cNvGrpSpPr/>
+        <p:nvPr/>
+      </p:nvGrpSpPr>
+      <p:grpSpPr>
+        <a:xfrm>
+          <a:off x="0" y="0"/>
+          <a:ext cx="0" cy="0"/>
+          <a:chOff x="0" y="0"/>
+          <a:chExt cx="0" cy="0"/>
+        </a:xfrm>
+      </p:grpSpPr>
+      <p:sp>
+        <p:nvSpPr>
+          <p:cNvPr id="2" name="Slide Image Placeholder 1"/>
+          <p:cNvSpPr>
+            <a:spLocks noGrp="1" noRot="1" noChangeAspect="1"/>
+          </p:cNvSpPr>
+          <p:nvPr>
+            <p:ph type="sldImg"/>
+          </p:nvPr>
+        </p:nvSpPr>
+        <p:spPr/>
+      </p:sp>
+      <p:sp>
+        <p:nvSpPr>
+          <p:cNvPr id="3" name="Notes Placeholder 2"/>
+          <p:cNvSpPr>
+            <a:spLocks noGrp="1"/>
+          </p:cNvSpPr>
+          <p:nvPr>
+            <p:ph type="body" idx="1"/>
+          </p:nvPr>
+        </p:nvSpPr>
+        <p:spPr/>
+        <p:txBody>
+          <a:bodyPr/>
+          <a:lstStyle/>
+          <a:p>
+            <a:pPr marL="0" marR="0" lvl="0" indent="0" algn="l" defTabSz="914400" rtl="0" eaLnBrk="1" fontAlgn="auto" latinLnBrk="0" hangingPunct="1">
+              <a:lnSpc>
+                <a:spcPct val="100000"/>
+              </a:lnSpc>
+              <a:spcBef>
+                <a:spcPts val="0"/>
+              </a:spcBef>
+              <a:spcAft>
+                <a:spcPts val="0"/>
+              </a:spcAft>
+              <a:buClrTx/>
+              <a:buSzTx/>
+              <a:buFontTx/>
+              <a:buNone/>
+              <a:tabLst/>
+              <a:defRPr/>
+            </a:pPr>
+            <a:r>
+              <a:rPr lang="en-CA" dirty="0"/>
+              <a:t>letters have to be properly oriented. Input characters have to be rotated to be correct before input.</a:t>
+            </a:r>
+          </a:p>
+          <a:p>
+            <a:endParaRPr lang="en-CA" dirty="0"/>
+          </a:p>
+        </p:txBody>
+      </p:sp>
+      <p:sp>
+        <p:nvSpPr>
+          <p:cNvPr id="4" name="Slide Number Placeholder 3"/>
+          <p:cNvSpPr>
+            <a:spLocks noGrp="1"/>
+          </p:cNvSpPr>
+          <p:nvPr>
+            <p:ph type="sldNum" sz="quarter" idx="5"/>
+          </p:nvPr>
+        </p:nvSpPr>
+        <p:spPr/>
+        <p:txBody>
+          <a:bodyPr/>
+          <a:lstStyle/>
+          <a:p>
+            <a:fld id="{04F82448-C671-4DAB-B542-F04D10043DD5}" type="slidenum">
+              <a:rPr lang="en-CA" smtClean="0"/>
+              <a:t>7</a:t>
+            </a:fld>
+            <a:endParaRPr lang="en-CA"/>
+          </a:p>
+        </p:txBody>
+      </p:sp>
+    </p:spTree>
+    <p:extLst>
+      <p:ext uri="{BB962C8B-B14F-4D97-AF65-F5344CB8AC3E}">
+        <p14:creationId xmlns:p14="http://schemas.microsoft.com/office/powerpoint/2010/main" val="253974040"/>
+      </p:ext>
+    </p:extLst>
+  </p:cSld>
+  <p:clrMapOvr>
+    <a:masterClrMapping/>
+  </p:clrMapOvr>
+</p:notes>
+</file>
+
 <file path=ppt/slideLayouts/slideLayout1.xml><?xml version="1.0" encoding="utf-8"?>
 <p:sldLayout xmlns:a="http://schemas.openxmlformats.org/drawingml/2006/main" xmlns:r="http://schemas.openxmlformats.org/officeDocument/2006/relationships" xmlns:p="http://schemas.openxmlformats.org/presentationml/2006/main" type="title" preserve="1">
   <p:cSld name="Title Slide">
@@ -4684,7 +4889,7 @@
           <a:p>
             <a:fld id="{D64C250B-3F0E-4970-9318-C9D7D394820E}" type="datetime1">
               <a:rPr lang="en-US" smtClean="0"/>
-              <a:t>1/25/2024</a:t>
+              <a:t>1/26/2024</a:t>
             </a:fld>
             <a:endParaRPr lang="en-US" dirty="0"/>
           </a:p>
@@ -5099,7 +5304,7 @@
           <a:p>
             <a:fld id="{7ED2D475-D7C3-4D53-A451-04FF36E3C7CA}" type="datetime1">
               <a:rPr lang="en-US" smtClean="0"/>
-              <a:t>1/25/2024</a:t>
+              <a:t>1/26/2024</a:t>
             </a:fld>
             <a:endParaRPr lang="en-US"/>
           </a:p>
@@ -5591,7 +5796,7 @@
           <a:p>
             <a:fld id="{B13D53CE-B973-4FCF-BB6D-73B61285C9EE}" type="datetime1">
               <a:rPr lang="en-US" smtClean="0"/>
-              <a:t>1/25/2024</a:t>
+              <a:t>1/26/2024</a:t>
             </a:fld>
             <a:endParaRPr lang="en-US"/>
           </a:p>
@@ -6078,7 +6283,7 @@
           <a:p>
             <a:fld id="{6F168777-EDFC-4AB3-A960-739B6325059F}" type="datetime1">
               <a:rPr lang="en-US" smtClean="0"/>
-              <a:t>1/25/2024</a:t>
+              <a:t>1/26/2024</a:t>
             </a:fld>
             <a:endParaRPr lang="en-US" dirty="0"/>
           </a:p>
@@ -6847,7 +7052,7 @@
           <a:p>
             <a:fld id="{4D320339-89DE-45C9-8EA6-5855C5BC4EC8}" type="datetime1">
               <a:rPr lang="en-US" smtClean="0"/>
-              <a:t>1/25/2024</a:t>
+              <a:t>1/26/2024</a:t>
             </a:fld>
             <a:endParaRPr lang="en-US"/>
           </a:p>
@@ -7329,7 +7534,7 @@
           <a:p>
             <a:fld id="{D97A0DFF-DDA9-437C-A4F4-5DF1C7108CDC}" type="datetime1">
               <a:rPr lang="en-US" smtClean="0"/>
-              <a:t>1/25/2024</a:t>
+              <a:t>1/26/2024</a:t>
             </a:fld>
             <a:endParaRPr lang="en-US"/>
           </a:p>
@@ -8025,7 +8230,7 @@
           <a:p>
             <a:fld id="{673E6A36-CFDC-4F59-94D9-5938EA3FFC22}" type="datetime1">
               <a:rPr lang="en-US" smtClean="0"/>
-              <a:t>1/25/2024</a:t>
+              <a:t>1/26/2024</a:t>
             </a:fld>
             <a:endParaRPr lang="en-US"/>
           </a:p>
@@ -8450,7 +8655,7 @@
           <a:p>
             <a:fld id="{585D03DC-4143-495E-82F1-B947FE3989AD}" type="datetime1">
               <a:rPr lang="en-US" smtClean="0"/>
-              <a:t>1/25/2024</a:t>
+              <a:t>1/26/2024</a:t>
             </a:fld>
             <a:endParaRPr lang="en-US"/>
           </a:p>
@@ -8847,7 +9052,7 @@
           <a:p>
             <a:fld id="{933DFF73-74E1-4718-A7DF-CE04E8339893}" type="datetime1">
               <a:rPr lang="en-US" smtClean="0"/>
-              <a:t>1/25/2024</a:t>
+              <a:t>1/26/2024</a:t>
             </a:fld>
             <a:endParaRPr lang="en-US"/>
           </a:p>
@@ -9442,7 +9647,7 @@
           <a:p>
             <a:fld id="{4EB71C7E-24B9-48A5-BD1A-C92D07E70F00}" type="datetime1">
               <a:rPr lang="en-US" smtClean="0"/>
-              <a:t>1/25/2024</a:t>
+              <a:t>1/26/2024</a:t>
             </a:fld>
             <a:endParaRPr lang="en-US"/>
           </a:p>
@@ -10017,7 +10222,7 @@
           <a:p>
             <a:fld id="{2E0181FF-DCB4-4A8B-8A91-9A9A7438884D}" type="datetime1">
               <a:rPr lang="en-US" smtClean="0"/>
-              <a:t>1/25/2024</a:t>
+              <a:t>1/26/2024</a:t>
             </a:fld>
             <a:endParaRPr lang="en-US"/>
           </a:p>
@@ -10543,7 +10748,7 @@
           <a:p>
             <a:fld id="{69064C32-6B48-4F37-8ABD-2C75CE9DDDEF}" type="datetime1">
               <a:rPr lang="en-US" smtClean="0"/>
-              <a:t>1/25/2024</a:t>
+              <a:t>1/26/2024</a:t>
             </a:fld>
             <a:endParaRPr lang="en-US" dirty="0"/>
           </a:p>
@@ -13019,13 +13224,13 @@
           <p:nvPr/>
         </p:nvPicPr>
         <p:blipFill>
-          <a:blip r:embed="rId2">
+          <a:blip r:embed="rId3">
             <a:extLst>
               <a:ext uri="{28A0092B-C50C-407E-A947-70E740481C1C}">
                 <a14:useLocalDpi xmlns:a14="http://schemas.microsoft.com/office/drawing/2010/main" val="0"/>
               </a:ext>
               <a:ext uri="{96DAC541-7B7A-43D3-8B79-37D633B846F1}">
-                <asvg:svgBlip xmlns:asvg="http://schemas.microsoft.com/office/drawing/2016/SVG/main" r:embed="rId3"/>
+                <asvg:svgBlip xmlns:asvg="http://schemas.microsoft.com/office/drawing/2016/SVG/main" r:embed="rId4"/>
               </a:ext>
             </a:extLst>
           </a:blip>
@@ -15797,6 +16002,11 @@
           </p:cNvGraphicFramePr>
           <p:nvPr>
             <p:ph idx="1"/>
+            <p:extLst>
+              <p:ext uri="{D42A27DB-BD31-4B8C-83A1-F6EECF244321}">
+                <p14:modId xmlns:p14="http://schemas.microsoft.com/office/powerpoint/2010/main" val="722016421"/>
+              </p:ext>
+            </p:extLst>
           </p:nvPr>
         </p:nvGraphicFramePr>
         <p:xfrm>
@@ -15805,7 +16015,7 @@
         </p:xfrm>
         <a:graphic>
           <a:graphicData uri="http://schemas.openxmlformats.org/drawingml/2006/diagram">
-            <dgm:relIds xmlns:dgm="http://schemas.openxmlformats.org/drawingml/2006/diagram" xmlns:r="http://schemas.openxmlformats.org/officeDocument/2006/relationships" r:dm="rId2" r:lo="rId3" r:qs="rId4" r:cs="rId5"/>
+            <dgm:relIds xmlns:dgm="http://schemas.openxmlformats.org/drawingml/2006/diagram" xmlns:r="http://schemas.openxmlformats.org/officeDocument/2006/relationships" r:dm="rId3" r:lo="rId4" r:qs="rId5" r:cs="rId6"/>
           </a:graphicData>
         </a:graphic>
       </p:graphicFrame>

</xml_diff>